<commit_message>
Added explanation for simulation section
</commit_message>
<xml_diff>
--- a/RA-L Hetro Sensors/pictures/simulation_table.pptx
+++ b/RA-L Hetro Sensors/pictures/simulation_table.pptx
@@ -2,12 +2,12 @@
 <file path=ppt/presentation.xml><?xml version="1.0" encoding="utf-8"?>
 <p:presentation xmlns:a="http://schemas.openxmlformats.org/drawingml/2006/main" xmlns:r="http://schemas.openxmlformats.org/officeDocument/2006/relationships" xmlns:p="http://schemas.openxmlformats.org/presentationml/2006/main" saveSubsetFonts="1">
   <p:sldMasterIdLst>
-    <p:sldMasterId id="2147483756" r:id="rId1"/>
+    <p:sldMasterId id="2147483804" r:id="rId1"/>
   </p:sldMasterIdLst>
   <p:sldIdLst>
     <p:sldId id="256" r:id="rId2"/>
   </p:sldIdLst>
-  <p:sldSz cx="13716000" cy="4114800"/>
+  <p:sldSz cx="13716000" cy="3017838"/>
   <p:notesSz cx="6858000" cy="9144000"/>
   <p:defaultTextStyle>
     <a:defPPr>
@@ -104,6 +104,11 @@
       </a:defRPr>
     </a:lvl9pPr>
   </p:defaultTextStyle>
+  <p:extLst>
+    <p:ext uri="{EFAFB233-063F-42B5-8137-9DF3F51BA10A}">
+      <p15:sldGuideLst xmlns:p15="http://schemas.microsoft.com/office/powerpoint/2012/main"/>
+    </p:ext>
+  </p:extLst>
 </p:presentation>
 </file>
 
@@ -136,15 +141,15 @@
         </p:nvSpPr>
         <p:spPr>
           <a:xfrm>
-            <a:off x="1714500" y="673418"/>
-            <a:ext cx="10287000" cy="1432560"/>
+            <a:off x="1714500" y="493892"/>
+            <a:ext cx="10287000" cy="1050655"/>
           </a:xfrm>
         </p:spPr>
         <p:txBody>
           <a:bodyPr anchor="b"/>
           <a:lstStyle>
             <a:lvl1pPr algn="ctr">
-              <a:defRPr sz="3600"/>
+              <a:defRPr sz="2640"/>
             </a:lvl1pPr>
           </a:lstStyle>
           <a:p>
@@ -168,8 +173,8 @@
         </p:nvSpPr>
         <p:spPr>
           <a:xfrm>
-            <a:off x="1714500" y="2161223"/>
-            <a:ext cx="10287000" cy="993457"/>
+            <a:off x="1714500" y="1585064"/>
+            <a:ext cx="10287000" cy="728612"/>
           </a:xfrm>
         </p:spPr>
         <p:txBody>
@@ -177,39 +182,39 @@
           <a:lstStyle>
             <a:lvl1pPr marL="0" indent="0" algn="ctr">
               <a:buNone/>
-              <a:defRPr sz="1440"/>
+              <a:defRPr sz="1056"/>
             </a:lvl1pPr>
-            <a:lvl2pPr marL="274320" indent="0" algn="ctr">
-              <a:buNone/>
-              <a:defRPr sz="1200"/>
+            <a:lvl2pPr marL="201168" indent="0" algn="ctr">
+              <a:buNone/>
+              <a:defRPr sz="880"/>
             </a:lvl2pPr>
-            <a:lvl3pPr marL="548640" indent="0" algn="ctr">
-              <a:buNone/>
-              <a:defRPr sz="1080"/>
+            <a:lvl3pPr marL="402336" indent="0" algn="ctr">
+              <a:buNone/>
+              <a:defRPr sz="792"/>
             </a:lvl3pPr>
-            <a:lvl4pPr marL="822960" indent="0" algn="ctr">
-              <a:buNone/>
-              <a:defRPr sz="960"/>
+            <a:lvl4pPr marL="603504" indent="0" algn="ctr">
+              <a:buNone/>
+              <a:defRPr sz="704"/>
             </a:lvl4pPr>
-            <a:lvl5pPr marL="1097280" indent="0" algn="ctr">
-              <a:buNone/>
-              <a:defRPr sz="960"/>
+            <a:lvl5pPr marL="804672" indent="0" algn="ctr">
+              <a:buNone/>
+              <a:defRPr sz="704"/>
             </a:lvl5pPr>
-            <a:lvl6pPr marL="1371600" indent="0" algn="ctr">
-              <a:buNone/>
-              <a:defRPr sz="960"/>
+            <a:lvl6pPr marL="1005840" indent="0" algn="ctr">
+              <a:buNone/>
+              <a:defRPr sz="704"/>
             </a:lvl6pPr>
-            <a:lvl7pPr marL="1645920" indent="0" algn="ctr">
-              <a:buNone/>
-              <a:defRPr sz="960"/>
+            <a:lvl7pPr marL="1207008" indent="0" algn="ctr">
+              <a:buNone/>
+              <a:defRPr sz="704"/>
             </a:lvl7pPr>
-            <a:lvl8pPr marL="1920240" indent="0" algn="ctr">
-              <a:buNone/>
-              <a:defRPr sz="960"/>
+            <a:lvl8pPr marL="1408176" indent="0" algn="ctr">
+              <a:buNone/>
+              <a:defRPr sz="704"/>
             </a:lvl8pPr>
-            <a:lvl9pPr marL="2194560" indent="0" algn="ctr">
-              <a:buNone/>
-              <a:defRPr sz="960"/>
+            <a:lvl9pPr marL="1609344" indent="0" algn="ctr">
+              <a:buNone/>
+              <a:defRPr sz="704"/>
             </a:lvl9pPr>
           </a:lstStyle>
           <a:p>
@@ -238,7 +243,7 @@
           <a:p>
             <a:fld id="{FAE35338-3DCF-4D20-9219-F6C2C71D316C}" type="datetimeFigureOut">
               <a:rPr lang="en-US" smtClean="0"/>
-              <a:t>9/7/2016</a:t>
+              <a:t>9/9/2016</a:t>
             </a:fld>
             <a:endParaRPr lang="en-US"/>
           </a:p>
@@ -289,7 +294,7 @@
     </p:spTree>
     <p:extLst>
       <p:ext uri="{BB962C8B-B14F-4D97-AF65-F5344CB8AC3E}">
-        <p14:creationId xmlns:p14="http://schemas.microsoft.com/office/powerpoint/2010/main" val="95030326"/>
+        <p14:creationId xmlns:p14="http://schemas.microsoft.com/office/powerpoint/2010/main" val="3286803682"/>
       </p:ext>
     </p:extLst>
   </p:cSld>
@@ -408,7 +413,7 @@
           <a:p>
             <a:fld id="{FAE35338-3DCF-4D20-9219-F6C2C71D316C}" type="datetimeFigureOut">
               <a:rPr lang="en-US" smtClean="0"/>
-              <a:t>9/7/2016</a:t>
+              <a:t>9/9/2016</a:t>
             </a:fld>
             <a:endParaRPr lang="en-US"/>
           </a:p>
@@ -459,7 +464,7 @@
     </p:spTree>
     <p:extLst>
       <p:ext uri="{BB962C8B-B14F-4D97-AF65-F5344CB8AC3E}">
-        <p14:creationId xmlns:p14="http://schemas.microsoft.com/office/powerpoint/2010/main" val="139378914"/>
+        <p14:creationId xmlns:p14="http://schemas.microsoft.com/office/powerpoint/2010/main" val="2907701785"/>
       </p:ext>
     </p:extLst>
   </p:cSld>
@@ -498,8 +503,8 @@
         </p:nvSpPr>
         <p:spPr>
           <a:xfrm>
-            <a:off x="9815512" y="219075"/>
-            <a:ext cx="2957513" cy="3487103"/>
+            <a:off x="9815512" y="160672"/>
+            <a:ext cx="2957513" cy="2557478"/>
           </a:xfrm>
         </p:spPr>
         <p:txBody>
@@ -526,8 +531,8 @@
         </p:nvSpPr>
         <p:spPr>
           <a:xfrm>
-            <a:off x="942975" y="219075"/>
-            <a:ext cx="8701088" cy="3487103"/>
+            <a:off x="942975" y="160672"/>
+            <a:ext cx="8701088" cy="2557478"/>
           </a:xfrm>
         </p:spPr>
         <p:txBody>
@@ -588,7 +593,7 @@
           <a:p>
             <a:fld id="{FAE35338-3DCF-4D20-9219-F6C2C71D316C}" type="datetimeFigureOut">
               <a:rPr lang="en-US" smtClean="0"/>
-              <a:t>9/7/2016</a:t>
+              <a:t>9/9/2016</a:t>
             </a:fld>
             <a:endParaRPr lang="en-US"/>
           </a:p>
@@ -639,7 +644,7 @@
     </p:spTree>
     <p:extLst>
       <p:ext uri="{BB962C8B-B14F-4D97-AF65-F5344CB8AC3E}">
-        <p14:creationId xmlns:p14="http://schemas.microsoft.com/office/powerpoint/2010/main" val="3153454925"/>
+        <p14:creationId xmlns:p14="http://schemas.microsoft.com/office/powerpoint/2010/main" val="3799562479"/>
       </p:ext>
     </p:extLst>
   </p:cSld>
@@ -758,7 +763,7 @@
           <a:p>
             <a:fld id="{FAE35338-3DCF-4D20-9219-F6C2C71D316C}" type="datetimeFigureOut">
               <a:rPr lang="en-US" smtClean="0"/>
-              <a:t>9/7/2016</a:t>
+              <a:t>9/9/2016</a:t>
             </a:fld>
             <a:endParaRPr lang="en-US"/>
           </a:p>
@@ -809,7 +814,7 @@
     </p:spTree>
     <p:extLst>
       <p:ext uri="{BB962C8B-B14F-4D97-AF65-F5344CB8AC3E}">
-        <p14:creationId xmlns:p14="http://schemas.microsoft.com/office/powerpoint/2010/main" val="4196796529"/>
+        <p14:creationId xmlns:p14="http://schemas.microsoft.com/office/powerpoint/2010/main" val="1729414709"/>
       </p:ext>
     </p:extLst>
   </p:cSld>
@@ -848,15 +853,15 @@
         </p:nvSpPr>
         <p:spPr>
           <a:xfrm>
-            <a:off x="935831" y="1025843"/>
-            <a:ext cx="11830050" cy="1711642"/>
+            <a:off x="935831" y="752364"/>
+            <a:ext cx="11830050" cy="1255337"/>
           </a:xfrm>
         </p:spPr>
         <p:txBody>
           <a:bodyPr anchor="b"/>
           <a:lstStyle>
             <a:lvl1pPr>
-              <a:defRPr sz="3600"/>
+              <a:defRPr sz="2640"/>
             </a:lvl1pPr>
           </a:lstStyle>
           <a:p>
@@ -880,8 +885,8 @@
         </p:nvSpPr>
         <p:spPr>
           <a:xfrm>
-            <a:off x="935831" y="2753678"/>
-            <a:ext cx="11830050" cy="900112"/>
+            <a:off x="935831" y="2019577"/>
+            <a:ext cx="11830050" cy="660152"/>
           </a:xfrm>
         </p:spPr>
         <p:txBody>
@@ -889,7 +894,7 @@
           <a:lstStyle>
             <a:lvl1pPr marL="0" indent="0">
               <a:buNone/>
-              <a:defRPr sz="1440">
+              <a:defRPr sz="1056">
                 <a:solidFill>
                   <a:schemeClr val="tx1">
                     <a:tint val="75000"/>
@@ -897,9 +902,9 @@
                 </a:solidFill>
               </a:defRPr>
             </a:lvl1pPr>
-            <a:lvl2pPr marL="274320" indent="0">
-              <a:buNone/>
-              <a:defRPr sz="1200">
+            <a:lvl2pPr marL="201168" indent="0">
+              <a:buNone/>
+              <a:defRPr sz="880">
                 <a:solidFill>
                   <a:schemeClr val="tx1">
                     <a:tint val="75000"/>
@@ -907,9 +912,9 @@
                 </a:solidFill>
               </a:defRPr>
             </a:lvl2pPr>
-            <a:lvl3pPr marL="548640" indent="0">
-              <a:buNone/>
-              <a:defRPr sz="1080">
+            <a:lvl3pPr marL="402336" indent="0">
+              <a:buNone/>
+              <a:defRPr sz="792">
                 <a:solidFill>
                   <a:schemeClr val="tx1">
                     <a:tint val="75000"/>
@@ -917,9 +922,9 @@
                 </a:solidFill>
               </a:defRPr>
             </a:lvl3pPr>
-            <a:lvl4pPr marL="822960" indent="0">
-              <a:buNone/>
-              <a:defRPr sz="960">
+            <a:lvl4pPr marL="603504" indent="0">
+              <a:buNone/>
+              <a:defRPr sz="704">
                 <a:solidFill>
                   <a:schemeClr val="tx1">
                     <a:tint val="75000"/>
@@ -927,9 +932,9 @@
                 </a:solidFill>
               </a:defRPr>
             </a:lvl4pPr>
-            <a:lvl5pPr marL="1097280" indent="0">
-              <a:buNone/>
-              <a:defRPr sz="960">
+            <a:lvl5pPr marL="804672" indent="0">
+              <a:buNone/>
+              <a:defRPr sz="704">
                 <a:solidFill>
                   <a:schemeClr val="tx1">
                     <a:tint val="75000"/>
@@ -937,9 +942,9 @@
                 </a:solidFill>
               </a:defRPr>
             </a:lvl5pPr>
-            <a:lvl6pPr marL="1371600" indent="0">
-              <a:buNone/>
-              <a:defRPr sz="960">
+            <a:lvl6pPr marL="1005840" indent="0">
+              <a:buNone/>
+              <a:defRPr sz="704">
                 <a:solidFill>
                   <a:schemeClr val="tx1">
                     <a:tint val="75000"/>
@@ -947,9 +952,9 @@
                 </a:solidFill>
               </a:defRPr>
             </a:lvl6pPr>
-            <a:lvl7pPr marL="1645920" indent="0">
-              <a:buNone/>
-              <a:defRPr sz="960">
+            <a:lvl7pPr marL="1207008" indent="0">
+              <a:buNone/>
+              <a:defRPr sz="704">
                 <a:solidFill>
                   <a:schemeClr val="tx1">
                     <a:tint val="75000"/>
@@ -957,9 +962,9 @@
                 </a:solidFill>
               </a:defRPr>
             </a:lvl7pPr>
-            <a:lvl8pPr marL="1920240" indent="0">
-              <a:buNone/>
-              <a:defRPr sz="960">
+            <a:lvl8pPr marL="1408176" indent="0">
+              <a:buNone/>
+              <a:defRPr sz="704">
                 <a:solidFill>
                   <a:schemeClr val="tx1">
                     <a:tint val="75000"/>
@@ -967,9 +972,9 @@
                 </a:solidFill>
               </a:defRPr>
             </a:lvl8pPr>
-            <a:lvl9pPr marL="2194560" indent="0">
-              <a:buNone/>
-              <a:defRPr sz="960">
+            <a:lvl9pPr marL="1609344" indent="0">
+              <a:buNone/>
+              <a:defRPr sz="704">
                 <a:solidFill>
                   <a:schemeClr val="tx1">
                     <a:tint val="75000"/>
@@ -1004,7 +1009,7 @@
           <a:p>
             <a:fld id="{FAE35338-3DCF-4D20-9219-F6C2C71D316C}" type="datetimeFigureOut">
               <a:rPr lang="en-US" smtClean="0"/>
-              <a:t>9/7/2016</a:t>
+              <a:t>9/9/2016</a:t>
             </a:fld>
             <a:endParaRPr lang="en-US"/>
           </a:p>
@@ -1055,7 +1060,7 @@
     </p:spTree>
     <p:extLst>
       <p:ext uri="{BB962C8B-B14F-4D97-AF65-F5344CB8AC3E}">
-        <p14:creationId xmlns:p14="http://schemas.microsoft.com/office/powerpoint/2010/main" val="61467329"/>
+        <p14:creationId xmlns:p14="http://schemas.microsoft.com/office/powerpoint/2010/main" val="1507834537"/>
       </p:ext>
     </p:extLst>
   </p:cSld>
@@ -1117,8 +1122,8 @@
         </p:nvSpPr>
         <p:spPr>
           <a:xfrm>
-            <a:off x="942975" y="1095375"/>
-            <a:ext cx="5829300" cy="2610803"/>
+            <a:off x="942975" y="803360"/>
+            <a:ext cx="5829300" cy="1914790"/>
           </a:xfrm>
         </p:spPr>
         <p:txBody>
@@ -1174,8 +1179,8 @@
         </p:nvSpPr>
         <p:spPr>
           <a:xfrm>
-            <a:off x="6943725" y="1095375"/>
-            <a:ext cx="5829300" cy="2610803"/>
+            <a:off x="6943725" y="803360"/>
+            <a:ext cx="5829300" cy="1914790"/>
           </a:xfrm>
         </p:spPr>
         <p:txBody>
@@ -1236,7 +1241,7 @@
           <a:p>
             <a:fld id="{FAE35338-3DCF-4D20-9219-F6C2C71D316C}" type="datetimeFigureOut">
               <a:rPr lang="en-US" smtClean="0"/>
-              <a:t>9/7/2016</a:t>
+              <a:t>9/9/2016</a:t>
             </a:fld>
             <a:endParaRPr lang="en-US"/>
           </a:p>
@@ -1287,7 +1292,7 @@
     </p:spTree>
     <p:extLst>
       <p:ext uri="{BB962C8B-B14F-4D97-AF65-F5344CB8AC3E}">
-        <p14:creationId xmlns:p14="http://schemas.microsoft.com/office/powerpoint/2010/main" val="1719127315"/>
+        <p14:creationId xmlns:p14="http://schemas.microsoft.com/office/powerpoint/2010/main" val="473622631"/>
       </p:ext>
     </p:extLst>
   </p:cSld>
@@ -1326,8 +1331,8 @@
         </p:nvSpPr>
         <p:spPr>
           <a:xfrm>
-            <a:off x="944762" y="219075"/>
-            <a:ext cx="11830050" cy="795338"/>
+            <a:off x="944762" y="160672"/>
+            <a:ext cx="11830050" cy="583309"/>
           </a:xfrm>
         </p:spPr>
         <p:txBody>
@@ -1354,8 +1359,8 @@
         </p:nvSpPr>
         <p:spPr>
           <a:xfrm>
-            <a:off x="944762" y="1008698"/>
-            <a:ext cx="5802510" cy="494347"/>
+            <a:off x="944762" y="739790"/>
+            <a:ext cx="5802510" cy="362559"/>
           </a:xfrm>
         </p:spPr>
         <p:txBody>
@@ -1363,39 +1368,39 @@
           <a:lstStyle>
             <a:lvl1pPr marL="0" indent="0">
               <a:buNone/>
-              <a:defRPr sz="1440" b="1"/>
+              <a:defRPr sz="1056" b="1"/>
             </a:lvl1pPr>
-            <a:lvl2pPr marL="274320" indent="0">
-              <a:buNone/>
-              <a:defRPr sz="1200" b="1"/>
+            <a:lvl2pPr marL="201168" indent="0">
+              <a:buNone/>
+              <a:defRPr sz="880" b="1"/>
             </a:lvl2pPr>
-            <a:lvl3pPr marL="548640" indent="0">
-              <a:buNone/>
-              <a:defRPr sz="1080" b="1"/>
+            <a:lvl3pPr marL="402336" indent="0">
+              <a:buNone/>
+              <a:defRPr sz="792" b="1"/>
             </a:lvl3pPr>
-            <a:lvl4pPr marL="822960" indent="0">
-              <a:buNone/>
-              <a:defRPr sz="960" b="1"/>
+            <a:lvl4pPr marL="603504" indent="0">
+              <a:buNone/>
+              <a:defRPr sz="704" b="1"/>
             </a:lvl4pPr>
-            <a:lvl5pPr marL="1097280" indent="0">
-              <a:buNone/>
-              <a:defRPr sz="960" b="1"/>
+            <a:lvl5pPr marL="804672" indent="0">
+              <a:buNone/>
+              <a:defRPr sz="704" b="1"/>
             </a:lvl5pPr>
-            <a:lvl6pPr marL="1371600" indent="0">
-              <a:buNone/>
-              <a:defRPr sz="960" b="1"/>
+            <a:lvl6pPr marL="1005840" indent="0">
+              <a:buNone/>
+              <a:defRPr sz="704" b="1"/>
             </a:lvl6pPr>
-            <a:lvl7pPr marL="1645920" indent="0">
-              <a:buNone/>
-              <a:defRPr sz="960" b="1"/>
+            <a:lvl7pPr marL="1207008" indent="0">
+              <a:buNone/>
+              <a:defRPr sz="704" b="1"/>
             </a:lvl7pPr>
-            <a:lvl8pPr marL="1920240" indent="0">
-              <a:buNone/>
-              <a:defRPr sz="960" b="1"/>
+            <a:lvl8pPr marL="1408176" indent="0">
+              <a:buNone/>
+              <a:defRPr sz="704" b="1"/>
             </a:lvl8pPr>
-            <a:lvl9pPr marL="2194560" indent="0">
-              <a:buNone/>
-              <a:defRPr sz="960" b="1"/>
+            <a:lvl9pPr marL="1609344" indent="0">
+              <a:buNone/>
+              <a:defRPr sz="704" b="1"/>
             </a:lvl9pPr>
           </a:lstStyle>
           <a:p>
@@ -1419,8 +1424,8 @@
         </p:nvSpPr>
         <p:spPr>
           <a:xfrm>
-            <a:off x="944762" y="1503045"/>
-            <a:ext cx="5802510" cy="2210753"/>
+            <a:off x="944762" y="1102349"/>
+            <a:ext cx="5802510" cy="1621390"/>
           </a:xfrm>
         </p:spPr>
         <p:txBody>
@@ -1476,8 +1481,8 @@
         </p:nvSpPr>
         <p:spPr>
           <a:xfrm>
-            <a:off x="6943725" y="1008698"/>
-            <a:ext cx="5831087" cy="494347"/>
+            <a:off x="6943725" y="739790"/>
+            <a:ext cx="5831087" cy="362559"/>
           </a:xfrm>
         </p:spPr>
         <p:txBody>
@@ -1485,39 +1490,39 @@
           <a:lstStyle>
             <a:lvl1pPr marL="0" indent="0">
               <a:buNone/>
-              <a:defRPr sz="1440" b="1"/>
+              <a:defRPr sz="1056" b="1"/>
             </a:lvl1pPr>
-            <a:lvl2pPr marL="274320" indent="0">
-              <a:buNone/>
-              <a:defRPr sz="1200" b="1"/>
+            <a:lvl2pPr marL="201168" indent="0">
+              <a:buNone/>
+              <a:defRPr sz="880" b="1"/>
             </a:lvl2pPr>
-            <a:lvl3pPr marL="548640" indent="0">
-              <a:buNone/>
-              <a:defRPr sz="1080" b="1"/>
+            <a:lvl3pPr marL="402336" indent="0">
+              <a:buNone/>
+              <a:defRPr sz="792" b="1"/>
             </a:lvl3pPr>
-            <a:lvl4pPr marL="822960" indent="0">
-              <a:buNone/>
-              <a:defRPr sz="960" b="1"/>
+            <a:lvl4pPr marL="603504" indent="0">
+              <a:buNone/>
+              <a:defRPr sz="704" b="1"/>
             </a:lvl4pPr>
-            <a:lvl5pPr marL="1097280" indent="0">
-              <a:buNone/>
-              <a:defRPr sz="960" b="1"/>
+            <a:lvl5pPr marL="804672" indent="0">
+              <a:buNone/>
+              <a:defRPr sz="704" b="1"/>
             </a:lvl5pPr>
-            <a:lvl6pPr marL="1371600" indent="0">
-              <a:buNone/>
-              <a:defRPr sz="960" b="1"/>
+            <a:lvl6pPr marL="1005840" indent="0">
+              <a:buNone/>
+              <a:defRPr sz="704" b="1"/>
             </a:lvl6pPr>
-            <a:lvl7pPr marL="1645920" indent="0">
-              <a:buNone/>
-              <a:defRPr sz="960" b="1"/>
+            <a:lvl7pPr marL="1207008" indent="0">
+              <a:buNone/>
+              <a:defRPr sz="704" b="1"/>
             </a:lvl7pPr>
-            <a:lvl8pPr marL="1920240" indent="0">
-              <a:buNone/>
-              <a:defRPr sz="960" b="1"/>
+            <a:lvl8pPr marL="1408176" indent="0">
+              <a:buNone/>
+              <a:defRPr sz="704" b="1"/>
             </a:lvl8pPr>
-            <a:lvl9pPr marL="2194560" indent="0">
-              <a:buNone/>
-              <a:defRPr sz="960" b="1"/>
+            <a:lvl9pPr marL="1609344" indent="0">
+              <a:buNone/>
+              <a:defRPr sz="704" b="1"/>
             </a:lvl9pPr>
           </a:lstStyle>
           <a:p>
@@ -1541,8 +1546,8 @@
         </p:nvSpPr>
         <p:spPr>
           <a:xfrm>
-            <a:off x="6943725" y="1503045"/>
-            <a:ext cx="5831087" cy="2210753"/>
+            <a:off x="6943725" y="1102349"/>
+            <a:ext cx="5831087" cy="1621390"/>
           </a:xfrm>
         </p:spPr>
         <p:txBody>
@@ -1603,7 +1608,7 @@
           <a:p>
             <a:fld id="{FAE35338-3DCF-4D20-9219-F6C2C71D316C}" type="datetimeFigureOut">
               <a:rPr lang="en-US" smtClean="0"/>
-              <a:t>9/7/2016</a:t>
+              <a:t>9/9/2016</a:t>
             </a:fld>
             <a:endParaRPr lang="en-US"/>
           </a:p>
@@ -1654,7 +1659,7 @@
     </p:spTree>
     <p:extLst>
       <p:ext uri="{BB962C8B-B14F-4D97-AF65-F5344CB8AC3E}">
-        <p14:creationId xmlns:p14="http://schemas.microsoft.com/office/powerpoint/2010/main" val="3836041388"/>
+        <p14:creationId xmlns:p14="http://schemas.microsoft.com/office/powerpoint/2010/main" val="4096225929"/>
       </p:ext>
     </p:extLst>
   </p:cSld>
@@ -1721,7 +1726,7 @@
           <a:p>
             <a:fld id="{FAE35338-3DCF-4D20-9219-F6C2C71D316C}" type="datetimeFigureOut">
               <a:rPr lang="en-US" smtClean="0"/>
-              <a:t>9/7/2016</a:t>
+              <a:t>9/9/2016</a:t>
             </a:fld>
             <a:endParaRPr lang="en-US"/>
           </a:p>
@@ -1772,7 +1777,7 @@
     </p:spTree>
     <p:extLst>
       <p:ext uri="{BB962C8B-B14F-4D97-AF65-F5344CB8AC3E}">
-        <p14:creationId xmlns:p14="http://schemas.microsoft.com/office/powerpoint/2010/main" val="3692370947"/>
+        <p14:creationId xmlns:p14="http://schemas.microsoft.com/office/powerpoint/2010/main" val="2030928642"/>
       </p:ext>
     </p:extLst>
   </p:cSld>
@@ -1816,7 +1821,7 @@
           <a:p>
             <a:fld id="{FAE35338-3DCF-4D20-9219-F6C2C71D316C}" type="datetimeFigureOut">
               <a:rPr lang="en-US" smtClean="0"/>
-              <a:t>9/7/2016</a:t>
+              <a:t>9/9/2016</a:t>
             </a:fld>
             <a:endParaRPr lang="en-US"/>
           </a:p>
@@ -1867,7 +1872,7 @@
     </p:spTree>
     <p:extLst>
       <p:ext uri="{BB962C8B-B14F-4D97-AF65-F5344CB8AC3E}">
-        <p14:creationId xmlns:p14="http://schemas.microsoft.com/office/powerpoint/2010/main" val="1399647374"/>
+        <p14:creationId xmlns:p14="http://schemas.microsoft.com/office/powerpoint/2010/main" val="1748940808"/>
       </p:ext>
     </p:extLst>
   </p:cSld>
@@ -1906,15 +1911,15 @@
         </p:nvSpPr>
         <p:spPr>
           <a:xfrm>
-            <a:off x="944762" y="274320"/>
-            <a:ext cx="4423767" cy="960120"/>
+            <a:off x="944762" y="201189"/>
+            <a:ext cx="4423767" cy="704162"/>
           </a:xfrm>
         </p:spPr>
         <p:txBody>
           <a:bodyPr anchor="b"/>
           <a:lstStyle>
             <a:lvl1pPr>
-              <a:defRPr sz="1920"/>
+              <a:defRPr sz="1408"/>
             </a:lvl1pPr>
           </a:lstStyle>
           <a:p>
@@ -1938,39 +1943,39 @@
         </p:nvSpPr>
         <p:spPr>
           <a:xfrm>
-            <a:off x="5831087" y="592455"/>
-            <a:ext cx="6943725" cy="2924175"/>
+            <a:off x="5831087" y="434513"/>
+            <a:ext cx="6943725" cy="2144621"/>
           </a:xfrm>
         </p:spPr>
         <p:txBody>
           <a:bodyPr/>
           <a:lstStyle>
             <a:lvl1pPr>
-              <a:defRPr sz="1920"/>
+              <a:defRPr sz="1408"/>
             </a:lvl1pPr>
             <a:lvl2pPr>
-              <a:defRPr sz="1680"/>
+              <a:defRPr sz="1232"/>
             </a:lvl2pPr>
             <a:lvl3pPr>
-              <a:defRPr sz="1440"/>
+              <a:defRPr sz="1056"/>
             </a:lvl3pPr>
             <a:lvl4pPr>
-              <a:defRPr sz="1200"/>
+              <a:defRPr sz="880"/>
             </a:lvl4pPr>
             <a:lvl5pPr>
-              <a:defRPr sz="1200"/>
+              <a:defRPr sz="880"/>
             </a:lvl5pPr>
             <a:lvl6pPr>
-              <a:defRPr sz="1200"/>
+              <a:defRPr sz="880"/>
             </a:lvl6pPr>
             <a:lvl7pPr>
-              <a:defRPr sz="1200"/>
+              <a:defRPr sz="880"/>
             </a:lvl7pPr>
             <a:lvl8pPr>
-              <a:defRPr sz="1200"/>
+              <a:defRPr sz="880"/>
             </a:lvl8pPr>
             <a:lvl9pPr>
-              <a:defRPr sz="1200"/>
+              <a:defRPr sz="880"/>
             </a:lvl9pPr>
           </a:lstStyle>
           <a:p>
@@ -2023,8 +2028,8 @@
         </p:nvSpPr>
         <p:spPr>
           <a:xfrm>
-            <a:off x="944762" y="1234440"/>
-            <a:ext cx="4423767" cy="2286953"/>
+            <a:off x="944762" y="905352"/>
+            <a:ext cx="4423767" cy="1677275"/>
           </a:xfrm>
         </p:spPr>
         <p:txBody>
@@ -2032,39 +2037,39 @@
           <a:lstStyle>
             <a:lvl1pPr marL="0" indent="0">
               <a:buNone/>
-              <a:defRPr sz="960"/>
+              <a:defRPr sz="704"/>
             </a:lvl1pPr>
-            <a:lvl2pPr marL="274320" indent="0">
-              <a:buNone/>
-              <a:defRPr sz="840"/>
+            <a:lvl2pPr marL="201168" indent="0">
+              <a:buNone/>
+              <a:defRPr sz="616"/>
             </a:lvl2pPr>
-            <a:lvl3pPr marL="548640" indent="0">
-              <a:buNone/>
-              <a:defRPr sz="720"/>
+            <a:lvl3pPr marL="402336" indent="0">
+              <a:buNone/>
+              <a:defRPr sz="528"/>
             </a:lvl3pPr>
-            <a:lvl4pPr marL="822960" indent="0">
-              <a:buNone/>
-              <a:defRPr sz="600"/>
+            <a:lvl4pPr marL="603504" indent="0">
+              <a:buNone/>
+              <a:defRPr sz="440"/>
             </a:lvl4pPr>
-            <a:lvl5pPr marL="1097280" indent="0">
-              <a:buNone/>
-              <a:defRPr sz="600"/>
+            <a:lvl5pPr marL="804672" indent="0">
+              <a:buNone/>
+              <a:defRPr sz="440"/>
             </a:lvl5pPr>
-            <a:lvl6pPr marL="1371600" indent="0">
-              <a:buNone/>
-              <a:defRPr sz="600"/>
+            <a:lvl6pPr marL="1005840" indent="0">
+              <a:buNone/>
+              <a:defRPr sz="440"/>
             </a:lvl6pPr>
-            <a:lvl7pPr marL="1645920" indent="0">
-              <a:buNone/>
-              <a:defRPr sz="600"/>
+            <a:lvl7pPr marL="1207008" indent="0">
+              <a:buNone/>
+              <a:defRPr sz="440"/>
             </a:lvl7pPr>
-            <a:lvl8pPr marL="1920240" indent="0">
-              <a:buNone/>
-              <a:defRPr sz="600"/>
+            <a:lvl8pPr marL="1408176" indent="0">
+              <a:buNone/>
+              <a:defRPr sz="440"/>
             </a:lvl8pPr>
-            <a:lvl9pPr marL="2194560" indent="0">
-              <a:buNone/>
-              <a:defRPr sz="600"/>
+            <a:lvl9pPr marL="1609344" indent="0">
+              <a:buNone/>
+              <a:defRPr sz="440"/>
             </a:lvl9pPr>
           </a:lstStyle>
           <a:p>
@@ -2093,7 +2098,7 @@
           <a:p>
             <a:fld id="{FAE35338-3DCF-4D20-9219-F6C2C71D316C}" type="datetimeFigureOut">
               <a:rPr lang="en-US" smtClean="0"/>
-              <a:t>9/7/2016</a:t>
+              <a:t>9/9/2016</a:t>
             </a:fld>
             <a:endParaRPr lang="en-US"/>
           </a:p>
@@ -2144,7 +2149,7 @@
     </p:spTree>
     <p:extLst>
       <p:ext uri="{BB962C8B-B14F-4D97-AF65-F5344CB8AC3E}">
-        <p14:creationId xmlns:p14="http://schemas.microsoft.com/office/powerpoint/2010/main" val="2507652863"/>
+        <p14:creationId xmlns:p14="http://schemas.microsoft.com/office/powerpoint/2010/main" val="2776833060"/>
       </p:ext>
     </p:extLst>
   </p:cSld>
@@ -2183,15 +2188,15 @@
         </p:nvSpPr>
         <p:spPr>
           <a:xfrm>
-            <a:off x="944762" y="274320"/>
-            <a:ext cx="4423767" cy="960120"/>
+            <a:off x="944762" y="201189"/>
+            <a:ext cx="4423767" cy="704162"/>
           </a:xfrm>
         </p:spPr>
         <p:txBody>
           <a:bodyPr anchor="b"/>
           <a:lstStyle>
             <a:lvl1pPr>
-              <a:defRPr sz="1920"/>
+              <a:defRPr sz="1408"/>
             </a:lvl1pPr>
           </a:lstStyle>
           <a:p>
@@ -2215,8 +2220,8 @@
         </p:nvSpPr>
         <p:spPr>
           <a:xfrm>
-            <a:off x="5831087" y="592455"/>
-            <a:ext cx="6943725" cy="2924175"/>
+            <a:off x="5831087" y="434513"/>
+            <a:ext cx="6943725" cy="2144621"/>
           </a:xfrm>
         </p:spPr>
         <p:txBody>
@@ -2224,39 +2229,39 @@
           <a:lstStyle>
             <a:lvl1pPr marL="0" indent="0">
               <a:buNone/>
-              <a:defRPr sz="1920"/>
+              <a:defRPr sz="1408"/>
             </a:lvl1pPr>
-            <a:lvl2pPr marL="274320" indent="0">
-              <a:buNone/>
-              <a:defRPr sz="1680"/>
+            <a:lvl2pPr marL="201168" indent="0">
+              <a:buNone/>
+              <a:defRPr sz="1232"/>
             </a:lvl2pPr>
-            <a:lvl3pPr marL="548640" indent="0">
-              <a:buNone/>
-              <a:defRPr sz="1440"/>
+            <a:lvl3pPr marL="402336" indent="0">
+              <a:buNone/>
+              <a:defRPr sz="1056"/>
             </a:lvl3pPr>
-            <a:lvl4pPr marL="822960" indent="0">
-              <a:buNone/>
-              <a:defRPr sz="1200"/>
+            <a:lvl4pPr marL="603504" indent="0">
+              <a:buNone/>
+              <a:defRPr sz="880"/>
             </a:lvl4pPr>
-            <a:lvl5pPr marL="1097280" indent="0">
-              <a:buNone/>
-              <a:defRPr sz="1200"/>
+            <a:lvl5pPr marL="804672" indent="0">
+              <a:buNone/>
+              <a:defRPr sz="880"/>
             </a:lvl5pPr>
-            <a:lvl6pPr marL="1371600" indent="0">
-              <a:buNone/>
-              <a:defRPr sz="1200"/>
+            <a:lvl6pPr marL="1005840" indent="0">
+              <a:buNone/>
+              <a:defRPr sz="880"/>
             </a:lvl6pPr>
-            <a:lvl7pPr marL="1645920" indent="0">
-              <a:buNone/>
-              <a:defRPr sz="1200"/>
+            <a:lvl7pPr marL="1207008" indent="0">
+              <a:buNone/>
+              <a:defRPr sz="880"/>
             </a:lvl7pPr>
-            <a:lvl8pPr marL="1920240" indent="0">
-              <a:buNone/>
-              <a:defRPr sz="1200"/>
+            <a:lvl8pPr marL="1408176" indent="0">
+              <a:buNone/>
+              <a:defRPr sz="880"/>
             </a:lvl8pPr>
-            <a:lvl9pPr marL="2194560" indent="0">
-              <a:buNone/>
-              <a:defRPr sz="1200"/>
+            <a:lvl9pPr marL="1609344" indent="0">
+              <a:buNone/>
+              <a:defRPr sz="880"/>
             </a:lvl9pPr>
           </a:lstStyle>
           <a:p>
@@ -2280,8 +2285,8 @@
         </p:nvSpPr>
         <p:spPr>
           <a:xfrm>
-            <a:off x="944762" y="1234440"/>
-            <a:ext cx="4423767" cy="2286953"/>
+            <a:off x="944762" y="905352"/>
+            <a:ext cx="4423767" cy="1677275"/>
           </a:xfrm>
         </p:spPr>
         <p:txBody>
@@ -2289,39 +2294,39 @@
           <a:lstStyle>
             <a:lvl1pPr marL="0" indent="0">
               <a:buNone/>
-              <a:defRPr sz="960"/>
+              <a:defRPr sz="704"/>
             </a:lvl1pPr>
-            <a:lvl2pPr marL="274320" indent="0">
-              <a:buNone/>
-              <a:defRPr sz="840"/>
+            <a:lvl2pPr marL="201168" indent="0">
+              <a:buNone/>
+              <a:defRPr sz="616"/>
             </a:lvl2pPr>
-            <a:lvl3pPr marL="548640" indent="0">
-              <a:buNone/>
-              <a:defRPr sz="720"/>
+            <a:lvl3pPr marL="402336" indent="0">
+              <a:buNone/>
+              <a:defRPr sz="528"/>
             </a:lvl3pPr>
-            <a:lvl4pPr marL="822960" indent="0">
-              <a:buNone/>
-              <a:defRPr sz="600"/>
+            <a:lvl4pPr marL="603504" indent="0">
+              <a:buNone/>
+              <a:defRPr sz="440"/>
             </a:lvl4pPr>
-            <a:lvl5pPr marL="1097280" indent="0">
-              <a:buNone/>
-              <a:defRPr sz="600"/>
+            <a:lvl5pPr marL="804672" indent="0">
+              <a:buNone/>
+              <a:defRPr sz="440"/>
             </a:lvl5pPr>
-            <a:lvl6pPr marL="1371600" indent="0">
-              <a:buNone/>
-              <a:defRPr sz="600"/>
+            <a:lvl6pPr marL="1005840" indent="0">
+              <a:buNone/>
+              <a:defRPr sz="440"/>
             </a:lvl6pPr>
-            <a:lvl7pPr marL="1645920" indent="0">
-              <a:buNone/>
-              <a:defRPr sz="600"/>
+            <a:lvl7pPr marL="1207008" indent="0">
+              <a:buNone/>
+              <a:defRPr sz="440"/>
             </a:lvl7pPr>
-            <a:lvl8pPr marL="1920240" indent="0">
-              <a:buNone/>
-              <a:defRPr sz="600"/>
+            <a:lvl8pPr marL="1408176" indent="0">
+              <a:buNone/>
+              <a:defRPr sz="440"/>
             </a:lvl8pPr>
-            <a:lvl9pPr marL="2194560" indent="0">
-              <a:buNone/>
-              <a:defRPr sz="600"/>
+            <a:lvl9pPr marL="1609344" indent="0">
+              <a:buNone/>
+              <a:defRPr sz="440"/>
             </a:lvl9pPr>
           </a:lstStyle>
           <a:p>
@@ -2350,7 +2355,7 @@
           <a:p>
             <a:fld id="{FAE35338-3DCF-4D20-9219-F6C2C71D316C}" type="datetimeFigureOut">
               <a:rPr lang="en-US" smtClean="0"/>
-              <a:t>9/7/2016</a:t>
+              <a:t>9/9/2016</a:t>
             </a:fld>
             <a:endParaRPr lang="en-US"/>
           </a:p>
@@ -2401,7 +2406,7 @@
     </p:spTree>
     <p:extLst>
       <p:ext uri="{BB962C8B-B14F-4D97-AF65-F5344CB8AC3E}">
-        <p14:creationId xmlns:p14="http://schemas.microsoft.com/office/powerpoint/2010/main" val="550688561"/>
+        <p14:creationId xmlns:p14="http://schemas.microsoft.com/office/powerpoint/2010/main" val="1853414432"/>
       </p:ext>
     </p:extLst>
   </p:cSld>
@@ -2445,8 +2450,8 @@
         </p:nvSpPr>
         <p:spPr>
           <a:xfrm>
-            <a:off x="942975" y="219075"/>
-            <a:ext cx="11830050" cy="795338"/>
+            <a:off x="942975" y="160672"/>
+            <a:ext cx="11830050" cy="583309"/>
           </a:xfrm>
           <a:prstGeom prst="rect">
             <a:avLst/>
@@ -2478,8 +2483,8 @@
         </p:nvSpPr>
         <p:spPr>
           <a:xfrm>
-            <a:off x="942975" y="1095375"/>
-            <a:ext cx="11830050" cy="2610803"/>
+            <a:off x="942975" y="803360"/>
+            <a:ext cx="11830050" cy="1914790"/>
           </a:xfrm>
           <a:prstGeom prst="rect">
             <a:avLst/>
@@ -2540,8 +2545,8 @@
         </p:nvSpPr>
         <p:spPr>
           <a:xfrm>
-            <a:off x="942975" y="3813810"/>
-            <a:ext cx="3086100" cy="219075"/>
+            <a:off x="942975" y="2797089"/>
+            <a:ext cx="3086100" cy="160672"/>
           </a:xfrm>
           <a:prstGeom prst="rect">
             <a:avLst/>
@@ -2551,7 +2556,7 @@
           <a:bodyPr vert="horz" lIns="91440" tIns="45720" rIns="91440" bIns="45720" rtlCol="0" anchor="ctr"/>
           <a:lstStyle>
             <a:lvl1pPr algn="l">
-              <a:defRPr sz="720">
+              <a:defRPr sz="528">
                 <a:solidFill>
                   <a:schemeClr val="tx1">
                     <a:tint val="75000"/>
@@ -2563,7 +2568,7 @@
           <a:p>
             <a:fld id="{FAE35338-3DCF-4D20-9219-F6C2C71D316C}" type="datetimeFigureOut">
               <a:rPr lang="en-US" smtClean="0"/>
-              <a:t>9/7/2016</a:t>
+              <a:t>9/9/2016</a:t>
             </a:fld>
             <a:endParaRPr lang="en-US"/>
           </a:p>
@@ -2581,8 +2586,8 @@
         </p:nvSpPr>
         <p:spPr>
           <a:xfrm>
-            <a:off x="4543425" y="3813810"/>
-            <a:ext cx="4629150" cy="219075"/>
+            <a:off x="4543425" y="2797089"/>
+            <a:ext cx="4629150" cy="160672"/>
           </a:xfrm>
           <a:prstGeom prst="rect">
             <a:avLst/>
@@ -2592,7 +2597,7 @@
           <a:bodyPr vert="horz" lIns="91440" tIns="45720" rIns="91440" bIns="45720" rtlCol="0" anchor="ctr"/>
           <a:lstStyle>
             <a:lvl1pPr algn="ctr">
-              <a:defRPr sz="720">
+              <a:defRPr sz="528">
                 <a:solidFill>
                   <a:schemeClr val="tx1">
                     <a:tint val="75000"/>
@@ -2618,8 +2623,8 @@
         </p:nvSpPr>
         <p:spPr>
           <a:xfrm>
-            <a:off x="9686925" y="3813810"/>
-            <a:ext cx="3086100" cy="219075"/>
+            <a:off x="9686925" y="2797089"/>
+            <a:ext cx="3086100" cy="160672"/>
           </a:xfrm>
           <a:prstGeom prst="rect">
             <a:avLst/>
@@ -2629,7 +2634,7 @@
           <a:bodyPr vert="horz" lIns="91440" tIns="45720" rIns="91440" bIns="45720" rtlCol="0" anchor="ctr"/>
           <a:lstStyle>
             <a:lvl1pPr algn="r">
-              <a:defRPr sz="720">
+              <a:defRPr sz="528">
                 <a:solidFill>
                   <a:schemeClr val="tx1">
                     <a:tint val="75000"/>
@@ -2650,27 +2655,27 @@
     </p:spTree>
     <p:extLst>
       <p:ext uri="{BB962C8B-B14F-4D97-AF65-F5344CB8AC3E}">
-        <p14:creationId xmlns:p14="http://schemas.microsoft.com/office/powerpoint/2010/main" val="4129535988"/>
+        <p14:creationId xmlns:p14="http://schemas.microsoft.com/office/powerpoint/2010/main" val="1001609895"/>
       </p:ext>
     </p:extLst>
   </p:cSld>
   <p:clrMap bg1="lt1" tx1="dk1" bg2="lt2" tx2="dk2" accent1="accent1" accent2="accent2" accent3="accent3" accent4="accent4" accent5="accent5" accent6="accent6" hlink="hlink" folHlink="folHlink"/>
   <p:sldLayoutIdLst>
-    <p:sldLayoutId id="2147483757" r:id="rId1"/>
-    <p:sldLayoutId id="2147483758" r:id="rId2"/>
-    <p:sldLayoutId id="2147483759" r:id="rId3"/>
-    <p:sldLayoutId id="2147483760" r:id="rId4"/>
-    <p:sldLayoutId id="2147483761" r:id="rId5"/>
-    <p:sldLayoutId id="2147483762" r:id="rId6"/>
-    <p:sldLayoutId id="2147483763" r:id="rId7"/>
-    <p:sldLayoutId id="2147483764" r:id="rId8"/>
-    <p:sldLayoutId id="2147483765" r:id="rId9"/>
-    <p:sldLayoutId id="2147483766" r:id="rId10"/>
-    <p:sldLayoutId id="2147483767" r:id="rId11"/>
+    <p:sldLayoutId id="2147483805" r:id="rId1"/>
+    <p:sldLayoutId id="2147483806" r:id="rId2"/>
+    <p:sldLayoutId id="2147483807" r:id="rId3"/>
+    <p:sldLayoutId id="2147483808" r:id="rId4"/>
+    <p:sldLayoutId id="2147483809" r:id="rId5"/>
+    <p:sldLayoutId id="2147483810" r:id="rId6"/>
+    <p:sldLayoutId id="2147483811" r:id="rId7"/>
+    <p:sldLayoutId id="2147483812" r:id="rId8"/>
+    <p:sldLayoutId id="2147483813" r:id="rId9"/>
+    <p:sldLayoutId id="2147483814" r:id="rId10"/>
+    <p:sldLayoutId id="2147483815" r:id="rId11"/>
   </p:sldLayoutIdLst>
   <p:txStyles>
     <p:titleStyle>
-      <a:lvl1pPr algn="l" defTabSz="548640" rtl="0" eaLnBrk="1" latinLnBrk="0" hangingPunct="1">
+      <a:lvl1pPr algn="l" defTabSz="402336" rtl="0" eaLnBrk="1" latinLnBrk="0" hangingPunct="1">
         <a:lnSpc>
           <a:spcPct val="90000"/>
         </a:lnSpc>
@@ -2678,7 +2683,7 @@
           <a:spcPct val="0"/>
         </a:spcBef>
         <a:buNone/>
-        <a:defRPr sz="2640" kern="1200">
+        <a:defRPr sz="1936" kern="1200">
           <a:solidFill>
             <a:schemeClr val="tx1"/>
           </a:solidFill>
@@ -2689,16 +2694,16 @@
       </a:lvl1pPr>
     </p:titleStyle>
     <p:bodyStyle>
-      <a:lvl1pPr marL="137160" indent="-137160" algn="l" defTabSz="548640" rtl="0" eaLnBrk="1" latinLnBrk="0" hangingPunct="1">
+      <a:lvl1pPr marL="100584" indent="-100584" algn="l" defTabSz="402336" rtl="0" eaLnBrk="1" latinLnBrk="0" hangingPunct="1">
         <a:lnSpc>
           <a:spcPct val="90000"/>
         </a:lnSpc>
         <a:spcBef>
-          <a:spcPts val="600"/>
+          <a:spcPts val="440"/>
         </a:spcBef>
         <a:buFont typeface="Arial" panose="020B0604020202020204" pitchFamily="34" charset="0"/>
         <a:buChar char="•"/>
-        <a:defRPr sz="1680" kern="1200">
+        <a:defRPr sz="1232" kern="1200">
           <a:solidFill>
             <a:schemeClr val="tx1"/>
           </a:solidFill>
@@ -2707,16 +2712,16 @@
           <a:cs typeface="+mn-cs"/>
         </a:defRPr>
       </a:lvl1pPr>
-      <a:lvl2pPr marL="411480" indent="-137160" algn="l" defTabSz="548640" rtl="0" eaLnBrk="1" latinLnBrk="0" hangingPunct="1">
+      <a:lvl2pPr marL="301752" indent="-100584" algn="l" defTabSz="402336" rtl="0" eaLnBrk="1" latinLnBrk="0" hangingPunct="1">
         <a:lnSpc>
           <a:spcPct val="90000"/>
         </a:lnSpc>
         <a:spcBef>
-          <a:spcPts val="300"/>
+          <a:spcPts val="220"/>
         </a:spcBef>
         <a:buFont typeface="Arial" panose="020B0604020202020204" pitchFamily="34" charset="0"/>
         <a:buChar char="•"/>
-        <a:defRPr sz="1440" kern="1200">
+        <a:defRPr sz="1056" kern="1200">
           <a:solidFill>
             <a:schemeClr val="tx1"/>
           </a:solidFill>
@@ -2725,16 +2730,16 @@
           <a:cs typeface="+mn-cs"/>
         </a:defRPr>
       </a:lvl2pPr>
-      <a:lvl3pPr marL="685800" indent="-137160" algn="l" defTabSz="548640" rtl="0" eaLnBrk="1" latinLnBrk="0" hangingPunct="1">
+      <a:lvl3pPr marL="502920" indent="-100584" algn="l" defTabSz="402336" rtl="0" eaLnBrk="1" latinLnBrk="0" hangingPunct="1">
         <a:lnSpc>
           <a:spcPct val="90000"/>
         </a:lnSpc>
         <a:spcBef>
-          <a:spcPts val="300"/>
+          <a:spcPts val="220"/>
         </a:spcBef>
         <a:buFont typeface="Arial" panose="020B0604020202020204" pitchFamily="34" charset="0"/>
         <a:buChar char="•"/>
-        <a:defRPr sz="1200" kern="1200">
+        <a:defRPr sz="880" kern="1200">
           <a:solidFill>
             <a:schemeClr val="tx1"/>
           </a:solidFill>
@@ -2743,16 +2748,16 @@
           <a:cs typeface="+mn-cs"/>
         </a:defRPr>
       </a:lvl3pPr>
-      <a:lvl4pPr marL="960120" indent="-137160" algn="l" defTabSz="548640" rtl="0" eaLnBrk="1" latinLnBrk="0" hangingPunct="1">
+      <a:lvl4pPr marL="704088" indent="-100584" algn="l" defTabSz="402336" rtl="0" eaLnBrk="1" latinLnBrk="0" hangingPunct="1">
         <a:lnSpc>
           <a:spcPct val="90000"/>
         </a:lnSpc>
         <a:spcBef>
-          <a:spcPts val="300"/>
+          <a:spcPts val="220"/>
         </a:spcBef>
         <a:buFont typeface="Arial" panose="020B0604020202020204" pitchFamily="34" charset="0"/>
         <a:buChar char="•"/>
-        <a:defRPr sz="1080" kern="1200">
+        <a:defRPr sz="792" kern="1200">
           <a:solidFill>
             <a:schemeClr val="tx1"/>
           </a:solidFill>
@@ -2761,16 +2766,16 @@
           <a:cs typeface="+mn-cs"/>
         </a:defRPr>
       </a:lvl4pPr>
-      <a:lvl5pPr marL="1234440" indent="-137160" algn="l" defTabSz="548640" rtl="0" eaLnBrk="1" latinLnBrk="0" hangingPunct="1">
+      <a:lvl5pPr marL="905256" indent="-100584" algn="l" defTabSz="402336" rtl="0" eaLnBrk="1" latinLnBrk="0" hangingPunct="1">
         <a:lnSpc>
           <a:spcPct val="90000"/>
         </a:lnSpc>
         <a:spcBef>
-          <a:spcPts val="300"/>
+          <a:spcPts val="220"/>
         </a:spcBef>
         <a:buFont typeface="Arial" panose="020B0604020202020204" pitchFamily="34" charset="0"/>
         <a:buChar char="•"/>
-        <a:defRPr sz="1080" kern="1200">
+        <a:defRPr sz="792" kern="1200">
           <a:solidFill>
             <a:schemeClr val="tx1"/>
           </a:solidFill>
@@ -2779,16 +2784,16 @@
           <a:cs typeface="+mn-cs"/>
         </a:defRPr>
       </a:lvl5pPr>
-      <a:lvl6pPr marL="1508760" indent="-137160" algn="l" defTabSz="548640" rtl="0" eaLnBrk="1" latinLnBrk="0" hangingPunct="1">
+      <a:lvl6pPr marL="1106424" indent="-100584" algn="l" defTabSz="402336" rtl="0" eaLnBrk="1" latinLnBrk="0" hangingPunct="1">
         <a:lnSpc>
           <a:spcPct val="90000"/>
         </a:lnSpc>
         <a:spcBef>
-          <a:spcPts val="300"/>
+          <a:spcPts val="220"/>
         </a:spcBef>
         <a:buFont typeface="Arial" panose="020B0604020202020204" pitchFamily="34" charset="0"/>
         <a:buChar char="•"/>
-        <a:defRPr sz="1080" kern="1200">
+        <a:defRPr sz="792" kern="1200">
           <a:solidFill>
             <a:schemeClr val="tx1"/>
           </a:solidFill>
@@ -2797,16 +2802,16 @@
           <a:cs typeface="+mn-cs"/>
         </a:defRPr>
       </a:lvl6pPr>
-      <a:lvl7pPr marL="1783080" indent="-137160" algn="l" defTabSz="548640" rtl="0" eaLnBrk="1" latinLnBrk="0" hangingPunct="1">
+      <a:lvl7pPr marL="1307592" indent="-100584" algn="l" defTabSz="402336" rtl="0" eaLnBrk="1" latinLnBrk="0" hangingPunct="1">
         <a:lnSpc>
           <a:spcPct val="90000"/>
         </a:lnSpc>
         <a:spcBef>
-          <a:spcPts val="300"/>
+          <a:spcPts val="220"/>
         </a:spcBef>
         <a:buFont typeface="Arial" panose="020B0604020202020204" pitchFamily="34" charset="0"/>
         <a:buChar char="•"/>
-        <a:defRPr sz="1080" kern="1200">
+        <a:defRPr sz="792" kern="1200">
           <a:solidFill>
             <a:schemeClr val="tx1"/>
           </a:solidFill>
@@ -2815,16 +2820,16 @@
           <a:cs typeface="+mn-cs"/>
         </a:defRPr>
       </a:lvl7pPr>
-      <a:lvl8pPr marL="2057400" indent="-137160" algn="l" defTabSz="548640" rtl="0" eaLnBrk="1" latinLnBrk="0" hangingPunct="1">
+      <a:lvl8pPr marL="1508760" indent="-100584" algn="l" defTabSz="402336" rtl="0" eaLnBrk="1" latinLnBrk="0" hangingPunct="1">
         <a:lnSpc>
           <a:spcPct val="90000"/>
         </a:lnSpc>
         <a:spcBef>
-          <a:spcPts val="300"/>
+          <a:spcPts val="220"/>
         </a:spcBef>
         <a:buFont typeface="Arial" panose="020B0604020202020204" pitchFamily="34" charset="0"/>
         <a:buChar char="•"/>
-        <a:defRPr sz="1080" kern="1200">
+        <a:defRPr sz="792" kern="1200">
           <a:solidFill>
             <a:schemeClr val="tx1"/>
           </a:solidFill>
@@ -2833,16 +2838,16 @@
           <a:cs typeface="+mn-cs"/>
         </a:defRPr>
       </a:lvl8pPr>
-      <a:lvl9pPr marL="2331720" indent="-137160" algn="l" defTabSz="548640" rtl="0" eaLnBrk="1" latinLnBrk="0" hangingPunct="1">
+      <a:lvl9pPr marL="1709928" indent="-100584" algn="l" defTabSz="402336" rtl="0" eaLnBrk="1" latinLnBrk="0" hangingPunct="1">
         <a:lnSpc>
           <a:spcPct val="90000"/>
         </a:lnSpc>
         <a:spcBef>
-          <a:spcPts val="300"/>
+          <a:spcPts val="220"/>
         </a:spcBef>
         <a:buFont typeface="Arial" panose="020B0604020202020204" pitchFamily="34" charset="0"/>
         <a:buChar char="•"/>
-        <a:defRPr sz="1080" kern="1200">
+        <a:defRPr sz="792" kern="1200">
           <a:solidFill>
             <a:schemeClr val="tx1"/>
           </a:solidFill>
@@ -2856,8 +2861,8 @@
       <a:defPPr>
         <a:defRPr lang="en-US"/>
       </a:defPPr>
-      <a:lvl1pPr marL="0" algn="l" defTabSz="548640" rtl="0" eaLnBrk="1" latinLnBrk="0" hangingPunct="1">
-        <a:defRPr sz="1080" kern="1200">
+      <a:lvl1pPr marL="0" algn="l" defTabSz="402336" rtl="0" eaLnBrk="1" latinLnBrk="0" hangingPunct="1">
+        <a:defRPr sz="792" kern="1200">
           <a:solidFill>
             <a:schemeClr val="tx1"/>
           </a:solidFill>
@@ -2866,8 +2871,8 @@
           <a:cs typeface="+mn-cs"/>
         </a:defRPr>
       </a:lvl1pPr>
-      <a:lvl2pPr marL="274320" algn="l" defTabSz="548640" rtl="0" eaLnBrk="1" latinLnBrk="0" hangingPunct="1">
-        <a:defRPr sz="1080" kern="1200">
+      <a:lvl2pPr marL="201168" algn="l" defTabSz="402336" rtl="0" eaLnBrk="1" latinLnBrk="0" hangingPunct="1">
+        <a:defRPr sz="792" kern="1200">
           <a:solidFill>
             <a:schemeClr val="tx1"/>
           </a:solidFill>
@@ -2876,8 +2881,8 @@
           <a:cs typeface="+mn-cs"/>
         </a:defRPr>
       </a:lvl2pPr>
-      <a:lvl3pPr marL="548640" algn="l" defTabSz="548640" rtl="0" eaLnBrk="1" latinLnBrk="0" hangingPunct="1">
-        <a:defRPr sz="1080" kern="1200">
+      <a:lvl3pPr marL="402336" algn="l" defTabSz="402336" rtl="0" eaLnBrk="1" latinLnBrk="0" hangingPunct="1">
+        <a:defRPr sz="792" kern="1200">
           <a:solidFill>
             <a:schemeClr val="tx1"/>
           </a:solidFill>
@@ -2886,8 +2891,8 @@
           <a:cs typeface="+mn-cs"/>
         </a:defRPr>
       </a:lvl3pPr>
-      <a:lvl4pPr marL="822960" algn="l" defTabSz="548640" rtl="0" eaLnBrk="1" latinLnBrk="0" hangingPunct="1">
-        <a:defRPr sz="1080" kern="1200">
+      <a:lvl4pPr marL="603504" algn="l" defTabSz="402336" rtl="0" eaLnBrk="1" latinLnBrk="0" hangingPunct="1">
+        <a:defRPr sz="792" kern="1200">
           <a:solidFill>
             <a:schemeClr val="tx1"/>
           </a:solidFill>
@@ -2896,8 +2901,8 @@
           <a:cs typeface="+mn-cs"/>
         </a:defRPr>
       </a:lvl4pPr>
-      <a:lvl5pPr marL="1097280" algn="l" defTabSz="548640" rtl="0" eaLnBrk="1" latinLnBrk="0" hangingPunct="1">
-        <a:defRPr sz="1080" kern="1200">
+      <a:lvl5pPr marL="804672" algn="l" defTabSz="402336" rtl="0" eaLnBrk="1" latinLnBrk="0" hangingPunct="1">
+        <a:defRPr sz="792" kern="1200">
           <a:solidFill>
             <a:schemeClr val="tx1"/>
           </a:solidFill>
@@ -2906,8 +2911,8 @@
           <a:cs typeface="+mn-cs"/>
         </a:defRPr>
       </a:lvl5pPr>
-      <a:lvl6pPr marL="1371600" algn="l" defTabSz="548640" rtl="0" eaLnBrk="1" latinLnBrk="0" hangingPunct="1">
-        <a:defRPr sz="1080" kern="1200">
+      <a:lvl6pPr marL="1005840" algn="l" defTabSz="402336" rtl="0" eaLnBrk="1" latinLnBrk="0" hangingPunct="1">
+        <a:defRPr sz="792" kern="1200">
           <a:solidFill>
             <a:schemeClr val="tx1"/>
           </a:solidFill>
@@ -2916,8 +2921,8 @@
           <a:cs typeface="+mn-cs"/>
         </a:defRPr>
       </a:lvl6pPr>
-      <a:lvl7pPr marL="1645920" algn="l" defTabSz="548640" rtl="0" eaLnBrk="1" latinLnBrk="0" hangingPunct="1">
-        <a:defRPr sz="1080" kern="1200">
+      <a:lvl7pPr marL="1207008" algn="l" defTabSz="402336" rtl="0" eaLnBrk="1" latinLnBrk="0" hangingPunct="1">
+        <a:defRPr sz="792" kern="1200">
           <a:solidFill>
             <a:schemeClr val="tx1"/>
           </a:solidFill>
@@ -2926,8 +2931,8 @@
           <a:cs typeface="+mn-cs"/>
         </a:defRPr>
       </a:lvl7pPr>
-      <a:lvl8pPr marL="1920240" algn="l" defTabSz="548640" rtl="0" eaLnBrk="1" latinLnBrk="0" hangingPunct="1">
-        <a:defRPr sz="1080" kern="1200">
+      <a:lvl8pPr marL="1408176" algn="l" defTabSz="402336" rtl="0" eaLnBrk="1" latinLnBrk="0" hangingPunct="1">
+        <a:defRPr sz="792" kern="1200">
           <a:solidFill>
             <a:schemeClr val="tx1"/>
           </a:solidFill>
@@ -2936,8 +2941,8 @@
           <a:cs typeface="+mn-cs"/>
         </a:defRPr>
       </a:lvl8pPr>
-      <a:lvl9pPr marL="2194560" algn="l" defTabSz="548640" rtl="0" eaLnBrk="1" latinLnBrk="0" hangingPunct="1">
-        <a:defRPr sz="1080" kern="1200">
+      <a:lvl9pPr marL="1609344" algn="l" defTabSz="402336" rtl="0" eaLnBrk="1" latinLnBrk="0" hangingPunct="1">
+        <a:defRPr sz="792" kern="1200">
           <a:solidFill>
             <a:schemeClr val="tx1"/>
           </a:solidFill>
@@ -2970,21 +2975,21 @@
       </p:grpSpPr>
       <p:graphicFrame>
         <p:nvGraphicFramePr>
-          <p:cNvPr id="31" name="Table 30"/>
+          <p:cNvPr id="4" name="Table 3"/>
           <p:cNvGraphicFramePr>
             <a:graphicFrameLocks noGrp="1"/>
           </p:cNvGraphicFramePr>
           <p:nvPr>
             <p:extLst>
               <p:ext uri="{D42A27DB-BD31-4B8C-83A1-F6EECF244321}">
-                <p14:modId xmlns:p14="http://schemas.microsoft.com/office/powerpoint/2010/main" val="3665741707"/>
+                <p14:modId xmlns:p14="http://schemas.microsoft.com/office/powerpoint/2010/main" val="323609892"/>
               </p:ext>
             </p:extLst>
           </p:nvPr>
         </p:nvGraphicFramePr>
         <p:xfrm>
-          <a:off x="36228" y="91761"/>
-          <a:ext cx="13654372" cy="3905037"/>
+          <a:off x="17756" y="24133"/>
+          <a:ext cx="13654372" cy="2959257"/>
         </p:xfrm>
         <a:graphic>
           <a:graphicData uri="http://schemas.openxmlformats.org/drawingml/2006/table">
@@ -3179,7 +3184,13 @@
                         <a:rPr lang="en-US" sz="2700" baseline="0" dirty="0" smtClean="0">
                           <a:latin typeface="Calibri" panose="020F0502020204030204" pitchFamily="34" charset="0"/>
                         </a:rPr>
-                        <a:t>10 Hexapods</a:t>
+                        <a:t>5000 </a:t>
+                      </a:r>
+                      <a:r>
+                        <a:rPr lang="en-US" sz="2700" baseline="0" dirty="0" smtClean="0">
+                          <a:latin typeface="Calibri" panose="020F0502020204030204" pitchFamily="34" charset="0"/>
+                        </a:rPr>
+                        <a:t>Hexapods</a:t>
                       </a:r>
                       <a:endParaRPr lang="en-US" sz="2700" dirty="0">
                         <a:latin typeface="Calibri" panose="020F0502020204030204" pitchFamily="34" charset="0"/>
@@ -3215,7 +3226,7 @@
                         <a:rPr lang="en-US" sz="2700" dirty="0" smtClean="0">
                           <a:latin typeface="Calibri" panose="020F0502020204030204" pitchFamily="34" charset="0"/>
                         </a:rPr>
-                        <a:t>1</a:t>
+                        <a:t>0.2</a:t>
                       </a:r>
                       <a:endParaRPr lang="en-US" sz="2700" dirty="0">
                         <a:latin typeface="Calibri" panose="020F0502020204030204" pitchFamily="34" charset="0"/>
@@ -3253,7 +3264,25 @@
                         <a:rPr lang="en-US" sz="2700" dirty="0" smtClean="0">
                           <a:latin typeface="Calibri" panose="020F0502020204030204" pitchFamily="34" charset="0"/>
                         </a:rPr>
-                        <a:t>Quadcopters, Smart Darts</a:t>
+                        <a:t>UAVs,</a:t>
+                      </a:r>
+                      <a:r>
+                        <a:rPr lang="en-US" sz="2700" baseline="0" dirty="0" smtClean="0">
+                          <a:latin typeface="Calibri" panose="020F0502020204030204" pitchFamily="34" charset="0"/>
+                        </a:rPr>
+                        <a:t> </a:t>
+                      </a:r>
+                      <a:r>
+                        <a:rPr lang="en-US" sz="2700" dirty="0" smtClean="0">
+                          <a:latin typeface="Calibri" panose="020F0502020204030204" pitchFamily="34" charset="0"/>
+                        </a:rPr>
+                        <a:t>Smart </a:t>
+                      </a:r>
+                      <a:r>
+                        <a:rPr lang="en-US" sz="2700" dirty="0" smtClean="0">
+                          <a:latin typeface="Calibri" panose="020F0502020204030204" pitchFamily="34" charset="0"/>
+                        </a:rPr>
+                        <a:t>Darts</a:t>
                       </a:r>
                       <a:endParaRPr lang="en-US" sz="2700" dirty="0">
                         <a:latin typeface="Calibri" panose="020F0502020204030204" pitchFamily="34" charset="0"/>
@@ -3288,20 +3317,17 @@
                         <a:rPr lang="en-US" sz="2700" dirty="0" smtClean="0">
                           <a:latin typeface="Calibri" panose="020F0502020204030204" pitchFamily="34" charset="0"/>
                         </a:rPr>
-                        <a:t>4 Quadcopters,</a:t>
+                        <a:t>500 UAVs, 5000</a:t>
                       </a:r>
                       <a:r>
                         <a:rPr lang="en-US" sz="2700" baseline="0" dirty="0" smtClean="0">
                           <a:latin typeface="Calibri" panose="020F0502020204030204" pitchFamily="34" charset="0"/>
                         </a:rPr>
-                        <a:t> 20 </a:t>
+                        <a:t> Smart Darts</a:t>
                       </a:r>
-                      <a:r>
-                        <a:rPr lang="en-US" sz="2700" dirty="0" smtClean="0">
-                          <a:latin typeface="Calibri" panose="020F0502020204030204" pitchFamily="34" charset="0"/>
-                        </a:rPr>
-                        <a:t>Smart Darts</a:t>
-                      </a:r>
+                      <a:endParaRPr lang="en-US" sz="2700" dirty="0" smtClean="0">
+                        <a:latin typeface="Calibri" panose="020F0502020204030204" pitchFamily="34" charset="0"/>
+                      </a:endParaRPr>
                     </a:p>
                   </a:txBody>
                   <a:tcPr marL="121921" marR="121921" marT="60959" marB="60959"/>
@@ -3315,7 +3341,7 @@
                         <a:rPr lang="en-US" sz="2700" dirty="0" smtClean="0">
                           <a:latin typeface="Calibri" panose="020F0502020204030204" pitchFamily="34" charset="0"/>
                         </a:rPr>
-                        <a:t>86</a:t>
+                        <a:t>1216</a:t>
                       </a:r>
                       <a:endParaRPr lang="en-US" sz="2700" dirty="0">
                         <a:latin typeface="Calibri" panose="020F0502020204030204" pitchFamily="34" charset="0"/>
@@ -3334,183 +3360,6 @@
                           <a:latin typeface="Calibri" panose="020F0502020204030204" pitchFamily="34" charset="0"/>
                         </a:rPr>
                         <a:t>20</a:t>
-                      </a:r>
-                      <a:endParaRPr lang="en-US" sz="2700" dirty="0">
-                        <a:latin typeface="Calibri" panose="020F0502020204030204" pitchFamily="34" charset="0"/>
-                      </a:endParaRPr>
-                    </a:p>
-                  </a:txBody>
-                  <a:tcPr marL="121921" marR="121921" marT="60959" marB="60959"/>
-                </a:tc>
-              </a:tr>
-              <a:tr h="945780">
-                <a:tc>
-                  <a:txBody>
-                    <a:bodyPr/>
-                    <a:lstStyle/>
-                    <a:p>
-                      <a:r>
-                        <a:rPr lang="en-US" sz="2700" dirty="0" smtClean="0">
-                          <a:latin typeface="Calibri" panose="020F0502020204030204" pitchFamily="34" charset="0"/>
-                        </a:rPr>
-                        <a:t>3.</a:t>
-                      </a:r>
-                      <a:endParaRPr lang="en-US" sz="2700" dirty="0">
-                        <a:latin typeface="Calibri" panose="020F0502020204030204" pitchFamily="34" charset="0"/>
-                      </a:endParaRPr>
-                    </a:p>
-                  </a:txBody>
-                  <a:tcPr marL="121921" marR="121921" marT="60959" marB="60959"/>
-                </a:tc>
-                <a:tc>
-                  <a:txBody>
-                    <a:bodyPr/>
-                    <a:lstStyle/>
-                    <a:p>
-                      <a:pPr marL="0" marR="0" lvl="0" indent="0" algn="l" defTabSz="457200" rtl="0" eaLnBrk="1" fontAlgn="auto" latinLnBrk="0" hangingPunct="1">
-                        <a:lnSpc>
-                          <a:spcPct val="100000"/>
-                        </a:lnSpc>
-                        <a:spcBef>
-                          <a:spcPts val="0"/>
-                        </a:spcBef>
-                        <a:spcAft>
-                          <a:spcPts val="0"/>
-                        </a:spcAft>
-                        <a:buClrTx/>
-                        <a:buSzTx/>
-                        <a:buFontTx/>
-                        <a:buNone/>
-                        <a:tabLst/>
-                        <a:defRPr/>
-                      </a:pPr>
-                      <a:r>
-                        <a:rPr lang="en-US" sz="2700" dirty="0" smtClean="0">
-                          <a:latin typeface="Calibri" panose="020F0502020204030204" pitchFamily="34" charset="0"/>
-                        </a:rPr>
-                        <a:t>Quadcopters,</a:t>
-                      </a:r>
-                      <a:r>
-                        <a:rPr lang="en-US" sz="2700" baseline="0" dirty="0" smtClean="0">
-                          <a:latin typeface="Calibri" panose="020F0502020204030204" pitchFamily="34" charset="0"/>
-                        </a:rPr>
-                        <a:t> Hexapods,  </a:t>
-                      </a:r>
-                      <a:r>
-                        <a:rPr lang="en-US" sz="2700" dirty="0" smtClean="0">
-                          <a:latin typeface="Calibri" panose="020F0502020204030204" pitchFamily="34" charset="0"/>
-                        </a:rPr>
-                        <a:t>Smart Darts</a:t>
-                      </a:r>
-                    </a:p>
-                  </a:txBody>
-                  <a:tcPr marL="121921" marR="121921" marT="60959" marB="60959"/>
-                </a:tc>
-                <a:tc>
-                  <a:txBody>
-                    <a:bodyPr/>
-                    <a:lstStyle/>
-                    <a:p>
-                      <a:pPr marL="0" marR="0" lvl="0" indent="0" algn="l" defTabSz="457200" rtl="0" eaLnBrk="1" fontAlgn="auto" latinLnBrk="0" hangingPunct="1">
-                        <a:lnSpc>
-                          <a:spcPct val="100000"/>
-                        </a:lnSpc>
-                        <a:spcBef>
-                          <a:spcPts val="0"/>
-                        </a:spcBef>
-                        <a:spcAft>
-                          <a:spcPts val="0"/>
-                        </a:spcAft>
-                        <a:buClrTx/>
-                        <a:buSzTx/>
-                        <a:buFontTx/>
-                        <a:buNone/>
-                        <a:tabLst/>
-                        <a:defRPr/>
-                      </a:pPr>
-                      <a:r>
-                        <a:rPr lang="en-US" sz="2700" dirty="0" smtClean="0">
-                          <a:latin typeface="Calibri" panose="020F0502020204030204" pitchFamily="34" charset="0"/>
-                        </a:rPr>
-                        <a:t>4 Quadcopters,</a:t>
-                      </a:r>
-                      <a:r>
-                        <a:rPr lang="en-US" sz="2700" baseline="0" dirty="0" smtClean="0">
-                          <a:latin typeface="Calibri" panose="020F0502020204030204" pitchFamily="34" charset="0"/>
-                        </a:rPr>
-                        <a:t> 10 Hexapods,</a:t>
-                      </a:r>
-                    </a:p>
-                    <a:p>
-                      <a:pPr marL="0" marR="0" lvl="0" indent="0" algn="l" defTabSz="457200" rtl="0" eaLnBrk="1" fontAlgn="auto" latinLnBrk="0" hangingPunct="1">
-                        <a:lnSpc>
-                          <a:spcPct val="100000"/>
-                        </a:lnSpc>
-                        <a:spcBef>
-                          <a:spcPts val="0"/>
-                        </a:spcBef>
-                        <a:spcAft>
-                          <a:spcPts val="0"/>
-                        </a:spcAft>
-                        <a:buClrTx/>
-                        <a:buSzTx/>
-                        <a:buFontTx/>
-                        <a:buNone/>
-                        <a:tabLst/>
-                        <a:defRPr/>
-                      </a:pPr>
-                      <a:r>
-                        <a:rPr lang="en-US" sz="2700" baseline="0" dirty="0" smtClean="0">
-                          <a:latin typeface="Calibri" panose="020F0502020204030204" pitchFamily="34" charset="0"/>
-                        </a:rPr>
-                        <a:t>20 </a:t>
-                      </a:r>
-                      <a:r>
-                        <a:rPr lang="en-US" sz="2700" dirty="0" smtClean="0">
-                          <a:latin typeface="Calibri" panose="020F0502020204030204" pitchFamily="34" charset="0"/>
-                        </a:rPr>
-                        <a:t>Smart Darts</a:t>
-                      </a:r>
-                    </a:p>
-                  </a:txBody>
-                  <a:tcPr marL="121921" marR="121921" marT="60959" marB="60959"/>
-                </a:tc>
-                <a:tc>
-                  <a:txBody>
-                    <a:bodyPr/>
-                    <a:lstStyle/>
-                    <a:p>
-                      <a:r>
-                        <a:rPr lang="en-US" sz="2700" dirty="0" smtClean="0">
-                          <a:latin typeface="Calibri" panose="020F0502020204030204" pitchFamily="34" charset="0"/>
-                        </a:rPr>
-                        <a:t>75</a:t>
-                      </a:r>
-                      <a:endParaRPr lang="en-US" sz="2700" dirty="0">
-                        <a:latin typeface="Calibri" panose="020F0502020204030204" pitchFamily="34" charset="0"/>
-                      </a:endParaRPr>
-                    </a:p>
-                  </a:txBody>
-                  <a:tcPr marL="121921" marR="121921" marT="60959" marB="60959"/>
-                </a:tc>
-                <a:tc>
-                  <a:txBody>
-                    <a:bodyPr/>
-                    <a:lstStyle/>
-                    <a:p>
-                      <a:r>
-                        <a:rPr lang="en-US" sz="2700" dirty="0" smtClean="0">
-                          <a:latin typeface="Calibri" panose="020F0502020204030204" pitchFamily="34" charset="0"/>
-                        </a:rPr>
-                        <a:t>Quad – 20</a:t>
-                      </a:r>
-                    </a:p>
-                    <a:p>
-                      <a:r>
-                        <a:rPr lang="en-US" sz="2700" dirty="0" smtClean="0">
-                          <a:latin typeface="Calibri" panose="020F0502020204030204" pitchFamily="34" charset="0"/>
-                        </a:rPr>
-                        <a:t>Hex - 1</a:t>
                       </a:r>
                       <a:endParaRPr lang="en-US" sz="2700" dirty="0">
                         <a:latin typeface="Calibri" panose="020F0502020204030204" pitchFamily="34" charset="0"/>
@@ -3566,7 +3415,19 @@
                         <a:rPr lang="en-US" sz="2700" dirty="0" smtClean="0">
                           <a:latin typeface="Calibri" panose="020F0502020204030204" pitchFamily="34" charset="0"/>
                         </a:rPr>
-                        <a:t>5 Workers, 75 Darts</a:t>
+                        <a:t>500 </a:t>
+                      </a:r>
+                      <a:r>
+                        <a:rPr lang="en-US" sz="2700" dirty="0" smtClean="0">
+                          <a:latin typeface="Calibri" panose="020F0502020204030204" pitchFamily="34" charset="0"/>
+                        </a:rPr>
+                        <a:t>Workers, </a:t>
+                      </a:r>
+                      <a:r>
+                        <a:rPr lang="en-US" sz="2700" dirty="0" smtClean="0">
+                          <a:latin typeface="Calibri" panose="020F0502020204030204" pitchFamily="34" charset="0"/>
+                        </a:rPr>
+                        <a:t>5000 Sensors</a:t>
                       </a:r>
                       <a:endParaRPr lang="en-US" sz="2700" dirty="0">
                         <a:latin typeface="Calibri" panose="020F0502020204030204" pitchFamily="34" charset="0"/>
@@ -3584,7 +3445,7 @@
                         <a:rPr lang="en-US" sz="2700" dirty="0" smtClean="0">
                           <a:latin typeface="Calibri" panose="020F0502020204030204" pitchFamily="34" charset="0"/>
                         </a:rPr>
-                        <a:t>467</a:t>
+                        <a:t>7371</a:t>
                       </a:r>
                       <a:endParaRPr lang="en-US" sz="2700" dirty="0">
                         <a:latin typeface="Calibri" panose="020F0502020204030204" pitchFamily="34" charset="0"/>

</xml_diff>

<commit_message>
did changes to simulations
</commit_message>
<xml_diff>
--- a/RA-L Hetro Sensors/pictures/simulation_table.pptx
+++ b/RA-L Hetro Sensors/pictures/simulation_table.pptx
@@ -243,7 +243,7 @@
           <a:p>
             <a:fld id="{FAE35338-3DCF-4D20-9219-F6C2C71D316C}" type="datetimeFigureOut">
               <a:rPr lang="en-US" smtClean="0"/>
-              <a:t>9/9/2016</a:t>
+              <a:t>9/10/2016</a:t>
             </a:fld>
             <a:endParaRPr lang="en-US"/>
           </a:p>
@@ -413,7 +413,7 @@
           <a:p>
             <a:fld id="{FAE35338-3DCF-4D20-9219-F6C2C71D316C}" type="datetimeFigureOut">
               <a:rPr lang="en-US" smtClean="0"/>
-              <a:t>9/9/2016</a:t>
+              <a:t>9/10/2016</a:t>
             </a:fld>
             <a:endParaRPr lang="en-US"/>
           </a:p>
@@ -593,7 +593,7 @@
           <a:p>
             <a:fld id="{FAE35338-3DCF-4D20-9219-F6C2C71D316C}" type="datetimeFigureOut">
               <a:rPr lang="en-US" smtClean="0"/>
-              <a:t>9/9/2016</a:t>
+              <a:t>9/10/2016</a:t>
             </a:fld>
             <a:endParaRPr lang="en-US"/>
           </a:p>
@@ -763,7 +763,7 @@
           <a:p>
             <a:fld id="{FAE35338-3DCF-4D20-9219-F6C2C71D316C}" type="datetimeFigureOut">
               <a:rPr lang="en-US" smtClean="0"/>
-              <a:t>9/9/2016</a:t>
+              <a:t>9/10/2016</a:t>
             </a:fld>
             <a:endParaRPr lang="en-US"/>
           </a:p>
@@ -1009,7 +1009,7 @@
           <a:p>
             <a:fld id="{FAE35338-3DCF-4D20-9219-F6C2C71D316C}" type="datetimeFigureOut">
               <a:rPr lang="en-US" smtClean="0"/>
-              <a:t>9/9/2016</a:t>
+              <a:t>9/10/2016</a:t>
             </a:fld>
             <a:endParaRPr lang="en-US"/>
           </a:p>
@@ -1241,7 +1241,7 @@
           <a:p>
             <a:fld id="{FAE35338-3DCF-4D20-9219-F6C2C71D316C}" type="datetimeFigureOut">
               <a:rPr lang="en-US" smtClean="0"/>
-              <a:t>9/9/2016</a:t>
+              <a:t>9/10/2016</a:t>
             </a:fld>
             <a:endParaRPr lang="en-US"/>
           </a:p>
@@ -1608,7 +1608,7 @@
           <a:p>
             <a:fld id="{FAE35338-3DCF-4D20-9219-F6C2C71D316C}" type="datetimeFigureOut">
               <a:rPr lang="en-US" smtClean="0"/>
-              <a:t>9/9/2016</a:t>
+              <a:t>9/10/2016</a:t>
             </a:fld>
             <a:endParaRPr lang="en-US"/>
           </a:p>
@@ -1726,7 +1726,7 @@
           <a:p>
             <a:fld id="{FAE35338-3DCF-4D20-9219-F6C2C71D316C}" type="datetimeFigureOut">
               <a:rPr lang="en-US" smtClean="0"/>
-              <a:t>9/9/2016</a:t>
+              <a:t>9/10/2016</a:t>
             </a:fld>
             <a:endParaRPr lang="en-US"/>
           </a:p>
@@ -1821,7 +1821,7 @@
           <a:p>
             <a:fld id="{FAE35338-3DCF-4D20-9219-F6C2C71D316C}" type="datetimeFigureOut">
               <a:rPr lang="en-US" smtClean="0"/>
-              <a:t>9/9/2016</a:t>
+              <a:t>9/10/2016</a:t>
             </a:fld>
             <a:endParaRPr lang="en-US"/>
           </a:p>
@@ -2098,7 +2098,7 @@
           <a:p>
             <a:fld id="{FAE35338-3DCF-4D20-9219-F6C2C71D316C}" type="datetimeFigureOut">
               <a:rPr lang="en-US" smtClean="0"/>
-              <a:t>9/9/2016</a:t>
+              <a:t>9/10/2016</a:t>
             </a:fld>
             <a:endParaRPr lang="en-US"/>
           </a:p>
@@ -2355,7 +2355,7 @@
           <a:p>
             <a:fld id="{FAE35338-3DCF-4D20-9219-F6C2C71D316C}" type="datetimeFigureOut">
               <a:rPr lang="en-US" smtClean="0"/>
-              <a:t>9/9/2016</a:t>
+              <a:t>9/10/2016</a:t>
             </a:fld>
             <a:endParaRPr lang="en-US"/>
           </a:p>
@@ -2568,7 +2568,7 @@
           <a:p>
             <a:fld id="{FAE35338-3DCF-4D20-9219-F6C2C71D316C}" type="datetimeFigureOut">
               <a:rPr lang="en-US" smtClean="0"/>
-              <a:t>9/9/2016</a:t>
+              <a:t>9/10/2016</a:t>
             </a:fld>
             <a:endParaRPr lang="en-US"/>
           </a:p>
@@ -2982,7 +2982,7 @@
           <p:nvPr>
             <p:extLst>
               <p:ext uri="{D42A27DB-BD31-4B8C-83A1-F6EECF244321}">
-                <p14:modId xmlns:p14="http://schemas.microsoft.com/office/powerpoint/2010/main" val="323609892"/>
+                <p14:modId xmlns:p14="http://schemas.microsoft.com/office/powerpoint/2010/main" val="1160406009"/>
               </p:ext>
             </p:extLst>
           </p:nvPr>
@@ -3184,13 +3184,7 @@
                         <a:rPr lang="en-US" sz="2700" baseline="0" dirty="0" smtClean="0">
                           <a:latin typeface="Calibri" panose="020F0502020204030204" pitchFamily="34" charset="0"/>
                         </a:rPr>
-                        <a:t>5000 </a:t>
-                      </a:r>
-                      <a:r>
-                        <a:rPr lang="en-US" sz="2700" baseline="0" dirty="0" smtClean="0">
-                          <a:latin typeface="Calibri" panose="020F0502020204030204" pitchFamily="34" charset="0"/>
-                        </a:rPr>
-                        <a:t>Hexapods</a:t>
+                        <a:t>5000 Hexapods</a:t>
                       </a:r>
                       <a:endParaRPr lang="en-US" sz="2700" dirty="0">
                         <a:latin typeface="Calibri" panose="020F0502020204030204" pitchFamily="34" charset="0"/>
@@ -3205,10 +3199,10 @@
                     <a:lstStyle/>
                     <a:p>
                       <a:r>
-                        <a:rPr lang="en-US" sz="2700" dirty="0" smtClean="0">
+                        <a:rPr lang="en-US" sz="2700" smtClean="0">
                           <a:latin typeface="Calibri" panose="020F0502020204030204" pitchFamily="34" charset="0"/>
                         </a:rPr>
-                        <a:t>471</a:t>
+                        <a:t>73893</a:t>
                       </a:r>
                       <a:endParaRPr lang="en-US" sz="2700" dirty="0">
                         <a:latin typeface="Calibri" panose="020F0502020204030204" pitchFamily="34" charset="0"/>
@@ -3276,13 +3270,7 @@
                         <a:rPr lang="en-US" sz="2700" dirty="0" smtClean="0">
                           <a:latin typeface="Calibri" panose="020F0502020204030204" pitchFamily="34" charset="0"/>
                         </a:rPr>
-                        <a:t>Smart </a:t>
-                      </a:r>
-                      <a:r>
-                        <a:rPr lang="en-US" sz="2700" dirty="0" smtClean="0">
-                          <a:latin typeface="Calibri" panose="020F0502020204030204" pitchFamily="34" charset="0"/>
-                        </a:rPr>
-                        <a:t>Darts</a:t>
+                        <a:t>Smart Darts</a:t>
                       </a:r>
                       <a:endParaRPr lang="en-US" sz="2700" dirty="0">
                         <a:latin typeface="Calibri" panose="020F0502020204030204" pitchFamily="34" charset="0"/>
@@ -3415,19 +3403,7 @@
                         <a:rPr lang="en-US" sz="2700" dirty="0" smtClean="0">
                           <a:latin typeface="Calibri" panose="020F0502020204030204" pitchFamily="34" charset="0"/>
                         </a:rPr>
-                        <a:t>500 </a:t>
-                      </a:r>
-                      <a:r>
-                        <a:rPr lang="en-US" sz="2700" dirty="0" smtClean="0">
-                          <a:latin typeface="Calibri" panose="020F0502020204030204" pitchFamily="34" charset="0"/>
-                        </a:rPr>
-                        <a:t>Workers, </a:t>
-                      </a:r>
-                      <a:r>
-                        <a:rPr lang="en-US" sz="2700" dirty="0" smtClean="0">
-                          <a:latin typeface="Calibri" panose="020F0502020204030204" pitchFamily="34" charset="0"/>
-                        </a:rPr>
-                        <a:t>5000 Sensors</a:t>
+                        <a:t>500 Workers, 5000 Sensors</a:t>
                       </a:r>
                       <a:endParaRPr lang="en-US" sz="2700" dirty="0">
                         <a:latin typeface="Calibri" panose="020F0502020204030204" pitchFamily="34" charset="0"/>

</xml_diff>